<commit_message>
Börjat med uppgift 1.
</commit_message>
<xml_diff>
--- a/Labb 2/Laboration2.pptx
+++ b/Labb 2/Laboration2.pptx
@@ -6,6 +6,7 @@
   </p:sldMasterIdLst>
   <p:sldIdLst>
     <p:sldId id="256" r:id="rId2"/>
+    <p:sldId id="257" r:id="rId3"/>
   </p:sldIdLst>
   <p:sldSz cx="9144000" cy="6858000" type="screen4x3"/>
   <p:notesSz cx="6858000" cy="9144000"/>
@@ -3151,15 +3152,7 @@
             </a:br>
             <a:r>
               <a:rPr lang="sv-SE" dirty="0" smtClean="0"/>
-              <a:t>Laboration </a:t>
-            </a:r>
-            <a:r>
-              <a:rPr lang="sv-SE" dirty="0" smtClean="0"/>
-              <a:t>2</a:t>
-            </a:r>
-            <a:r>
-              <a:rPr lang="sv-SE" dirty="0" smtClean="0"/>
-              <a:t/>
+              <a:t>Laboration 2</a:t>
             </a:r>
             <a:br>
               <a:rPr lang="sv-SE" dirty="0" smtClean="0"/>
@@ -3176,6 +3169,794 @@
     <p:extLst>
       <p:ext uri="{BB962C8B-B14F-4D97-AF65-F5344CB8AC3E}">
         <p14:creationId xmlns:p14="http://schemas.microsoft.com/office/powerpoint/2010/main" val="3298495681"/>
+      </p:ext>
+    </p:extLst>
+  </p:cSld>
+  <p:clrMapOvr>
+    <a:masterClrMapping/>
+  </p:clrMapOvr>
+</p:sld>
+</file>
+
+<file path=ppt/slides/slide2.xml><?xml version="1.0" encoding="utf-8"?>
+<p:sld xmlns:a="http://schemas.openxmlformats.org/drawingml/2006/main" xmlns:r="http://schemas.openxmlformats.org/officeDocument/2006/relationships" xmlns:p="http://schemas.openxmlformats.org/presentationml/2006/main">
+  <p:cSld>
+    <p:spTree>
+      <p:nvGrpSpPr>
+        <p:cNvPr id="1" name=""/>
+        <p:cNvGrpSpPr/>
+        <p:nvPr/>
+      </p:nvGrpSpPr>
+      <p:grpSpPr>
+        <a:xfrm>
+          <a:off x="0" y="0"/>
+          <a:ext cx="0" cy="0"/>
+          <a:chOff x="0" y="0"/>
+          <a:chExt cx="0" cy="0"/>
+        </a:xfrm>
+      </p:grpSpPr>
+      <p:sp>
+        <p:nvSpPr>
+          <p:cNvPr id="2" name="Title 1"/>
+          <p:cNvSpPr>
+            <a:spLocks noGrp="1"/>
+          </p:cNvSpPr>
+          <p:nvPr>
+            <p:ph type="title"/>
+          </p:nvPr>
+        </p:nvSpPr>
+        <p:spPr>
+          <a:xfrm>
+            <a:off x="-324544" y="0"/>
+            <a:ext cx="7272808" cy="692696"/>
+          </a:xfrm>
+        </p:spPr>
+        <p:txBody>
+          <a:bodyPr>
+            <a:normAutofit fontScale="90000"/>
+          </a:bodyPr>
+          <a:lstStyle/>
+          <a:p>
+            <a:r>
+              <a:rPr lang="sv-SE" dirty="0" smtClean="0"/>
+              <a:t>Uppgift 1 – Normalisera Dator</a:t>
+            </a:r>
+            <a:endParaRPr lang="sv-SE" dirty="0"/>
+          </a:p>
+        </p:txBody>
+      </p:sp>
+      <p:graphicFrame>
+        <p:nvGraphicFramePr>
+          <p:cNvPr id="4" name="Table 3"/>
+          <p:cNvGraphicFramePr>
+            <a:graphicFrameLocks noGrp="1"/>
+          </p:cNvGraphicFramePr>
+          <p:nvPr>
+            <p:extLst>
+              <p:ext uri="{D42A27DB-BD31-4B8C-83A1-F6EECF244321}">
+                <p14:modId xmlns:p14="http://schemas.microsoft.com/office/powerpoint/2010/main" val="2246356363"/>
+              </p:ext>
+            </p:extLst>
+          </p:nvPr>
+        </p:nvGraphicFramePr>
+        <p:xfrm>
+          <a:off x="35496" y="1824529"/>
+          <a:ext cx="9014624" cy="1463040"/>
+        </p:xfrm>
+        <a:graphic>
+          <a:graphicData uri="http://schemas.openxmlformats.org/drawingml/2006/table">
+            <a:tbl>
+              <a:tblPr firstRow="1" bandRow="1">
+                <a:tableStyleId>{5C22544A-7EE6-4342-B048-85BDC9FD1C3A}</a:tableStyleId>
+              </a:tblPr>
+              <a:tblGrid>
+                <a:gridCol w="1425702"/>
+                <a:gridCol w="1183155"/>
+                <a:gridCol w="1407875"/>
+                <a:gridCol w="1426817"/>
+                <a:gridCol w="1604281"/>
+                <a:gridCol w="1966794"/>
+              </a:tblGrid>
+              <a:tr h="324036">
+                <a:tc>
+                  <a:txBody>
+                    <a:bodyPr/>
+                    <a:lstStyle/>
+                    <a:p>
+                      <a:r>
+                        <a:rPr lang="sv-SE" dirty="0" smtClean="0"/>
+                        <a:t>MjukvaruNR</a:t>
+                      </a:r>
+                      <a:endParaRPr lang="sv-SE" dirty="0"/>
+                    </a:p>
+                  </a:txBody>
+                  <a:tcPr>
+                    <a:lnL w="12700" cap="flat" cmpd="sng" algn="ctr">
+                      <a:solidFill>
+                        <a:schemeClr val="tx1"/>
+                      </a:solidFill>
+                      <a:prstDash val="solid"/>
+                      <a:round/>
+                      <a:headEnd type="none" w="med" len="med"/>
+                      <a:tailEnd type="none" w="med" len="med"/>
+                    </a:lnL>
+                    <a:lnR w="12700" cap="flat" cmpd="sng" algn="ctr">
+                      <a:solidFill>
+                        <a:schemeClr val="tx1"/>
+                      </a:solidFill>
+                      <a:prstDash val="solid"/>
+                      <a:round/>
+                      <a:headEnd type="none" w="med" len="med"/>
+                      <a:tailEnd type="none" w="med" len="med"/>
+                    </a:lnR>
+                    <a:lnT w="12700" cap="flat" cmpd="sng" algn="ctr">
+                      <a:solidFill>
+                        <a:schemeClr val="tx1"/>
+                      </a:solidFill>
+                      <a:prstDash val="solid"/>
+                      <a:round/>
+                      <a:headEnd type="none" w="med" len="med"/>
+                      <a:tailEnd type="none" w="med" len="med"/>
+                    </a:lnT>
+                    <a:lnB w="12700" cap="flat" cmpd="sng" algn="ctr">
+                      <a:solidFill>
+                        <a:schemeClr val="tx1"/>
+                      </a:solidFill>
+                      <a:prstDash val="solid"/>
+                      <a:round/>
+                      <a:headEnd type="none" w="med" len="med"/>
+                      <a:tailEnd type="none" w="med" len="med"/>
+                    </a:lnB>
+                  </a:tcPr>
+                </a:tc>
+                <a:tc>
+                  <a:txBody>
+                    <a:bodyPr/>
+                    <a:lstStyle/>
+                    <a:p>
+                      <a:r>
+                        <a:rPr lang="sv-SE" dirty="0" smtClean="0"/>
+                        <a:t>DatorID</a:t>
+                      </a:r>
+                      <a:endParaRPr lang="sv-SE" dirty="0"/>
+                    </a:p>
+                  </a:txBody>
+                  <a:tcPr>
+                    <a:lnL w="12700" cap="flat" cmpd="sng" algn="ctr">
+                      <a:solidFill>
+                        <a:schemeClr val="tx1"/>
+                      </a:solidFill>
+                      <a:prstDash val="solid"/>
+                      <a:round/>
+                      <a:headEnd type="none" w="med" len="med"/>
+                      <a:tailEnd type="none" w="med" len="med"/>
+                    </a:lnL>
+                    <a:lnR w="12700" cap="flat" cmpd="sng" algn="ctr">
+                      <a:solidFill>
+                        <a:schemeClr val="tx1"/>
+                      </a:solidFill>
+                      <a:prstDash val="solid"/>
+                      <a:round/>
+                      <a:headEnd type="none" w="med" len="med"/>
+                      <a:tailEnd type="none" w="med" len="med"/>
+                    </a:lnR>
+                    <a:lnT w="12700" cap="flat" cmpd="sng" algn="ctr">
+                      <a:solidFill>
+                        <a:schemeClr val="tx1"/>
+                      </a:solidFill>
+                      <a:prstDash val="solid"/>
+                      <a:round/>
+                      <a:headEnd type="none" w="med" len="med"/>
+                      <a:tailEnd type="none" w="med" len="med"/>
+                    </a:lnT>
+                    <a:lnB w="12700" cap="flat" cmpd="sng" algn="ctr">
+                      <a:solidFill>
+                        <a:schemeClr val="tx1"/>
+                      </a:solidFill>
+                      <a:prstDash val="solid"/>
+                      <a:round/>
+                      <a:headEnd type="none" w="med" len="med"/>
+                      <a:tailEnd type="none" w="med" len="med"/>
+                    </a:lnB>
+                  </a:tcPr>
+                </a:tc>
+                <a:tc>
+                  <a:txBody>
+                    <a:bodyPr/>
+                    <a:lstStyle/>
+                    <a:p>
+                      <a:r>
+                        <a:rPr lang="sv-SE" dirty="0" smtClean="0"/>
+                        <a:t>Mjukvara</a:t>
+                      </a:r>
+                      <a:endParaRPr lang="sv-SE" dirty="0"/>
+                    </a:p>
+                  </a:txBody>
+                  <a:tcPr>
+                    <a:lnL w="12700" cap="flat" cmpd="sng" algn="ctr">
+                      <a:solidFill>
+                        <a:schemeClr val="tx1"/>
+                      </a:solidFill>
+                      <a:prstDash val="solid"/>
+                      <a:round/>
+                      <a:headEnd type="none" w="med" len="med"/>
+                      <a:tailEnd type="none" w="med" len="med"/>
+                    </a:lnL>
+                    <a:lnR w="12700" cap="flat" cmpd="sng" algn="ctr">
+                      <a:solidFill>
+                        <a:schemeClr val="tx1"/>
+                      </a:solidFill>
+                      <a:prstDash val="solid"/>
+                      <a:round/>
+                      <a:headEnd type="none" w="med" len="med"/>
+                      <a:tailEnd type="none" w="med" len="med"/>
+                    </a:lnR>
+                    <a:lnT w="12700" cap="flat" cmpd="sng" algn="ctr">
+                      <a:noFill/>
+                      <a:prstDash val="solid"/>
+                      <a:round/>
+                      <a:headEnd type="none" w="med" len="med"/>
+                      <a:tailEnd type="none" w="med" len="med"/>
+                    </a:lnT>
+                    <a:lnB w="12700" cap="flat" cmpd="sng" algn="ctr">
+                      <a:solidFill>
+                        <a:schemeClr val="tx1"/>
+                      </a:solidFill>
+                      <a:prstDash val="solid"/>
+                      <a:round/>
+                      <a:headEnd type="none" w="med" len="med"/>
+                      <a:tailEnd type="none" w="med" len="med"/>
+                    </a:lnB>
+                  </a:tcPr>
+                </a:tc>
+                <a:tc>
+                  <a:txBody>
+                    <a:bodyPr/>
+                    <a:lstStyle/>
+                    <a:p>
+                      <a:r>
+                        <a:rPr lang="sv-SE" dirty="0" smtClean="0"/>
+                        <a:t>Mjukvarutyp</a:t>
+                      </a:r>
+                      <a:endParaRPr lang="sv-SE" dirty="0"/>
+                    </a:p>
+                  </a:txBody>
+                  <a:tcPr>
+                    <a:lnL w="12700" cap="flat" cmpd="sng" algn="ctr">
+                      <a:solidFill>
+                        <a:schemeClr val="tx1"/>
+                      </a:solidFill>
+                      <a:prstDash val="solid"/>
+                      <a:round/>
+                      <a:headEnd type="none" w="med" len="med"/>
+                      <a:tailEnd type="none" w="med" len="med"/>
+                    </a:lnL>
+                    <a:lnR w="12700" cap="flat" cmpd="sng" algn="ctr">
+                      <a:solidFill>
+                        <a:schemeClr val="tx1"/>
+                      </a:solidFill>
+                      <a:prstDash val="solid"/>
+                      <a:round/>
+                      <a:headEnd type="none" w="med" len="med"/>
+                      <a:tailEnd type="none" w="med" len="med"/>
+                    </a:lnR>
+                    <a:lnT w="12700" cap="flat" cmpd="sng" algn="ctr">
+                      <a:noFill/>
+                      <a:prstDash val="solid"/>
+                      <a:round/>
+                      <a:headEnd type="none" w="med" len="med"/>
+                      <a:tailEnd type="none" w="med" len="med"/>
+                    </a:lnT>
+                    <a:lnB w="12700" cap="flat" cmpd="sng" algn="ctr">
+                      <a:solidFill>
+                        <a:schemeClr val="tx1"/>
+                      </a:solidFill>
+                      <a:prstDash val="solid"/>
+                      <a:round/>
+                      <a:headEnd type="none" w="med" len="med"/>
+                      <a:tailEnd type="none" w="med" len="med"/>
+                    </a:lnB>
+                  </a:tcPr>
+                </a:tc>
+                <a:tc>
+                  <a:txBody>
+                    <a:bodyPr/>
+                    <a:lstStyle/>
+                    <a:p>
+                      <a:r>
+                        <a:rPr lang="sv-SE" dirty="0" smtClean="0"/>
+                        <a:t>Datorplacering</a:t>
+                      </a:r>
+                      <a:endParaRPr lang="sv-SE" dirty="0"/>
+                    </a:p>
+                  </a:txBody>
+                  <a:tcPr>
+                    <a:lnL w="12700" cap="flat" cmpd="sng" algn="ctr">
+                      <a:solidFill>
+                        <a:schemeClr val="tx1"/>
+                      </a:solidFill>
+                      <a:prstDash val="solid"/>
+                      <a:round/>
+                      <a:headEnd type="none" w="med" len="med"/>
+                      <a:tailEnd type="none" w="med" len="med"/>
+                    </a:lnL>
+                    <a:lnR w="12700" cap="flat" cmpd="sng" algn="ctr">
+                      <a:solidFill>
+                        <a:schemeClr val="tx1"/>
+                      </a:solidFill>
+                      <a:prstDash val="solid"/>
+                      <a:round/>
+                      <a:headEnd type="none" w="med" len="med"/>
+                      <a:tailEnd type="none" w="med" len="med"/>
+                    </a:lnR>
+                    <a:lnT w="12700" cap="flat" cmpd="sng" algn="ctr">
+                      <a:noFill/>
+                      <a:prstDash val="solid"/>
+                      <a:round/>
+                      <a:headEnd type="none" w="med" len="med"/>
+                      <a:tailEnd type="none" w="med" len="med"/>
+                    </a:lnT>
+                    <a:lnB w="12700" cap="flat" cmpd="sng" algn="ctr">
+                      <a:solidFill>
+                        <a:schemeClr val="tx1"/>
+                      </a:solidFill>
+                      <a:prstDash val="solid"/>
+                      <a:round/>
+                      <a:headEnd type="none" w="med" len="med"/>
+                      <a:tailEnd type="none" w="med" len="med"/>
+                    </a:lnB>
+                  </a:tcPr>
+                </a:tc>
+                <a:tc>
+                  <a:txBody>
+                    <a:bodyPr/>
+                    <a:lstStyle/>
+                    <a:p>
+                      <a:r>
+                        <a:rPr lang="sv-SE" dirty="0" smtClean="0"/>
+                        <a:t>Installationsdatum</a:t>
+                      </a:r>
+                      <a:endParaRPr lang="sv-SE" dirty="0"/>
+                    </a:p>
+                  </a:txBody>
+                  <a:tcPr>
+                    <a:lnL w="12700" cap="flat" cmpd="sng" algn="ctr">
+                      <a:solidFill>
+                        <a:schemeClr val="tx1"/>
+                      </a:solidFill>
+                      <a:prstDash val="solid"/>
+                      <a:round/>
+                      <a:headEnd type="none" w="med" len="med"/>
+                      <a:tailEnd type="none" w="med" len="med"/>
+                    </a:lnL>
+                    <a:lnR w="12700" cap="flat" cmpd="sng" algn="ctr">
+                      <a:solidFill>
+                        <a:schemeClr val="tx1"/>
+                      </a:solidFill>
+                      <a:prstDash val="solid"/>
+                      <a:round/>
+                      <a:headEnd type="none" w="med" len="med"/>
+                      <a:tailEnd type="none" w="med" len="med"/>
+                    </a:lnR>
+                    <a:lnT w="12700" cap="flat" cmpd="sng" algn="ctr">
+                      <a:noFill/>
+                      <a:prstDash val="solid"/>
+                      <a:round/>
+                      <a:headEnd type="none" w="med" len="med"/>
+                      <a:tailEnd type="none" w="med" len="med"/>
+                    </a:lnT>
+                    <a:lnB w="12700" cap="flat" cmpd="sng" algn="ctr">
+                      <a:solidFill>
+                        <a:schemeClr val="tx1"/>
+                      </a:solidFill>
+                      <a:prstDash val="solid"/>
+                      <a:round/>
+                      <a:headEnd type="none" w="med" len="med"/>
+                      <a:tailEnd type="none" w="med" len="med"/>
+                    </a:lnB>
+                  </a:tcPr>
+                </a:tc>
+              </a:tr>
+              <a:tr h="324036">
+                <a:tc>
+                  <a:txBody>
+                    <a:bodyPr/>
+                    <a:lstStyle/>
+                    <a:p>
+                      <a:r>
+                        <a:rPr lang="sv-SE" dirty="0" smtClean="0"/>
+                        <a:t>MS10032 </a:t>
+                      </a:r>
+                      <a:endParaRPr lang="sv-SE" dirty="0"/>
+                    </a:p>
+                  </a:txBody>
+                  <a:tcPr>
+                    <a:lnT w="12700" cap="flat" cmpd="sng" algn="ctr">
+                      <a:solidFill>
+                        <a:schemeClr val="tx1"/>
+                      </a:solidFill>
+                      <a:prstDash val="solid"/>
+                      <a:round/>
+                      <a:headEnd type="none" w="med" len="med"/>
+                      <a:tailEnd type="none" w="med" len="med"/>
+                    </a:lnT>
+                  </a:tcPr>
+                </a:tc>
+                <a:tc>
+                  <a:txBody>
+                    <a:bodyPr/>
+                    <a:lstStyle/>
+                    <a:p>
+                      <a:r>
+                        <a:rPr lang="sv-SE" dirty="0" smtClean="0"/>
+                        <a:t>849542</a:t>
+                      </a:r>
+                      <a:endParaRPr lang="sv-SE" dirty="0"/>
+                    </a:p>
+                  </a:txBody>
+                  <a:tcPr>
+                    <a:lnT w="12700" cap="flat" cmpd="sng" algn="ctr">
+                      <a:solidFill>
+                        <a:schemeClr val="tx1"/>
+                      </a:solidFill>
+                      <a:prstDash val="solid"/>
+                      <a:round/>
+                      <a:headEnd type="none" w="med" len="med"/>
+                      <a:tailEnd type="none" w="med" len="med"/>
+                    </a:lnT>
+                  </a:tcPr>
+                </a:tc>
+                <a:tc>
+                  <a:txBody>
+                    <a:bodyPr/>
+                    <a:lstStyle/>
+                    <a:p>
+                      <a:r>
+                        <a:rPr lang="sv-SE" dirty="0" smtClean="0"/>
+                        <a:t>Office</a:t>
+                      </a:r>
+                      <a:endParaRPr lang="sv-SE" dirty="0"/>
+                    </a:p>
+                  </a:txBody>
+                  <a:tcPr>
+                    <a:lnT w="12700" cap="flat" cmpd="sng" algn="ctr">
+                      <a:solidFill>
+                        <a:schemeClr val="tx1"/>
+                      </a:solidFill>
+                      <a:prstDash val="solid"/>
+                      <a:round/>
+                      <a:headEnd type="none" w="med" len="med"/>
+                      <a:tailEnd type="none" w="med" len="med"/>
+                    </a:lnT>
+                  </a:tcPr>
+                </a:tc>
+                <a:tc>
+                  <a:txBody>
+                    <a:bodyPr/>
+                    <a:lstStyle/>
+                    <a:p>
+                      <a:r>
+                        <a:rPr lang="sv-SE" dirty="0" smtClean="0"/>
+                        <a:t>KM</a:t>
+                      </a:r>
+                      <a:endParaRPr lang="sv-SE" dirty="0"/>
+                    </a:p>
+                  </a:txBody>
+                  <a:tcPr>
+                    <a:lnT w="12700" cap="flat" cmpd="sng" algn="ctr">
+                      <a:solidFill>
+                        <a:schemeClr val="tx1"/>
+                      </a:solidFill>
+                      <a:prstDash val="solid"/>
+                      <a:round/>
+                      <a:headEnd type="none" w="med" len="med"/>
+                      <a:tailEnd type="none" w="med" len="med"/>
+                    </a:lnT>
+                  </a:tcPr>
+                </a:tc>
+                <a:tc>
+                  <a:txBody>
+                    <a:bodyPr/>
+                    <a:lstStyle/>
+                    <a:p>
+                      <a:r>
+                        <a:rPr lang="sv-SE" dirty="0" smtClean="0"/>
+                        <a:t>Sal Te222</a:t>
+                      </a:r>
+                      <a:endParaRPr lang="sv-SE" dirty="0"/>
+                    </a:p>
+                  </a:txBody>
+                  <a:tcPr>
+                    <a:lnT w="12700" cap="flat" cmpd="sng" algn="ctr">
+                      <a:solidFill>
+                        <a:schemeClr val="tx1"/>
+                      </a:solidFill>
+                      <a:prstDash val="solid"/>
+                      <a:round/>
+                      <a:headEnd type="none" w="med" len="med"/>
+                      <a:tailEnd type="none" w="med" len="med"/>
+                    </a:lnT>
+                  </a:tcPr>
+                </a:tc>
+                <a:tc>
+                  <a:txBody>
+                    <a:bodyPr/>
+                    <a:lstStyle/>
+                    <a:p>
+                      <a:r>
+                        <a:rPr lang="sv-SE" dirty="0" smtClean="0"/>
+                        <a:t>2005-01-13</a:t>
+                      </a:r>
+                      <a:endParaRPr lang="sv-SE" dirty="0"/>
+                    </a:p>
+                  </a:txBody>
+                  <a:tcPr>
+                    <a:lnT w="12700" cap="flat" cmpd="sng" algn="ctr">
+                      <a:solidFill>
+                        <a:schemeClr val="tx1"/>
+                      </a:solidFill>
+                      <a:prstDash val="solid"/>
+                      <a:round/>
+                      <a:headEnd type="none" w="med" len="med"/>
+                      <a:tailEnd type="none" w="med" len="med"/>
+                    </a:lnT>
+                  </a:tcPr>
+                </a:tc>
+              </a:tr>
+              <a:tr h="324036">
+                <a:tc>
+                  <a:txBody>
+                    <a:bodyPr/>
+                    <a:lstStyle/>
+                    <a:p>
+                      <a:r>
+                        <a:rPr lang="sv-SE" dirty="0" smtClean="0"/>
+                        <a:t>NS10432</a:t>
+                      </a:r>
+                      <a:endParaRPr lang="sv-SE" dirty="0"/>
+                    </a:p>
+                  </a:txBody>
+                  <a:tcPr/>
+                </a:tc>
+                <a:tc>
+                  <a:txBody>
+                    <a:bodyPr/>
+                    <a:lstStyle/>
+                    <a:p>
+                      <a:r>
+                        <a:rPr lang="sv-SE" dirty="0" smtClean="0"/>
+                        <a:t>546534</a:t>
+                      </a:r>
+                      <a:endParaRPr lang="sv-SE" dirty="0"/>
+                    </a:p>
+                  </a:txBody>
+                  <a:tcPr/>
+                </a:tc>
+                <a:tc>
+                  <a:txBody>
+                    <a:bodyPr/>
+                    <a:lstStyle/>
+                    <a:p>
+                      <a:r>
+                        <a:rPr lang="sv-SE" dirty="0" smtClean="0"/>
+                        <a:t>FireFox</a:t>
+                      </a:r>
+                      <a:endParaRPr lang="sv-SE" dirty="0"/>
+                    </a:p>
+                  </a:txBody>
+                  <a:tcPr/>
+                </a:tc>
+                <a:tc>
+                  <a:txBody>
+                    <a:bodyPr/>
+                    <a:lstStyle/>
+                    <a:p>
+                      <a:r>
+                        <a:rPr lang="sv-SE" dirty="0" smtClean="0"/>
+                        <a:t>WL</a:t>
+                      </a:r>
+                      <a:endParaRPr lang="sv-SE" dirty="0"/>
+                    </a:p>
+                  </a:txBody>
+                  <a:tcPr/>
+                </a:tc>
+                <a:tc>
+                  <a:txBody>
+                    <a:bodyPr/>
+                    <a:lstStyle/>
+                    <a:p>
+                      <a:r>
+                        <a:rPr lang="sv-SE" dirty="0" smtClean="0"/>
+                        <a:t>Sal Te237</a:t>
+                      </a:r>
+                      <a:endParaRPr lang="sv-SE" dirty="0"/>
+                    </a:p>
+                  </a:txBody>
+                  <a:tcPr/>
+                </a:tc>
+                <a:tc>
+                  <a:txBody>
+                    <a:bodyPr/>
+                    <a:lstStyle/>
+                    <a:p>
+                      <a:r>
+                        <a:rPr lang="sv-SE" dirty="0" smtClean="0"/>
+                        <a:t>2004-08-19</a:t>
+                      </a:r>
+                      <a:endParaRPr lang="sv-SE" dirty="0"/>
+                    </a:p>
+                  </a:txBody>
+                  <a:tcPr/>
+                </a:tc>
+              </a:tr>
+              <a:tr h="324036">
+                <a:tc>
+                  <a:txBody>
+                    <a:bodyPr/>
+                    <a:lstStyle/>
+                    <a:p>
+                      <a:r>
+                        <a:rPr lang="sv-SE" dirty="0" smtClean="0"/>
+                        <a:t>MS12354</a:t>
+                      </a:r>
+                      <a:endParaRPr lang="sv-SE" dirty="0"/>
+                    </a:p>
+                  </a:txBody>
+                  <a:tcPr/>
+                </a:tc>
+                <a:tc>
+                  <a:txBody>
+                    <a:bodyPr/>
+                    <a:lstStyle/>
+                    <a:p>
+                      <a:r>
+                        <a:rPr lang="sv-SE" dirty="0" smtClean="0"/>
+                        <a:t>843543</a:t>
+                      </a:r>
+                      <a:endParaRPr lang="sv-SE" dirty="0"/>
+                    </a:p>
+                  </a:txBody>
+                  <a:tcPr/>
+                </a:tc>
+                <a:tc>
+                  <a:txBody>
+                    <a:bodyPr/>
+                    <a:lstStyle/>
+                    <a:p>
+                      <a:r>
+                        <a:rPr lang="sv-SE" dirty="0" smtClean="0"/>
+                        <a:t>Visual Studio</a:t>
+                      </a:r>
+                      <a:endParaRPr lang="sv-SE" dirty="0"/>
+                    </a:p>
+                  </a:txBody>
+                  <a:tcPr/>
+                </a:tc>
+                <a:tc>
+                  <a:txBody>
+                    <a:bodyPr/>
+                    <a:lstStyle/>
+                    <a:p>
+                      <a:r>
+                        <a:rPr lang="sv-SE" dirty="0" smtClean="0"/>
+                        <a:t>PV</a:t>
+                      </a:r>
+                      <a:endParaRPr lang="sv-SE" dirty="0"/>
+                    </a:p>
+                  </a:txBody>
+                  <a:tcPr/>
+                </a:tc>
+                <a:tc>
+                  <a:txBody>
+                    <a:bodyPr/>
+                    <a:lstStyle/>
+                    <a:p>
+                      <a:r>
+                        <a:rPr lang="sv-SE" dirty="0" smtClean="0"/>
+                        <a:t>Sal Te220 </a:t>
+                      </a:r>
+                      <a:endParaRPr lang="sv-SE" dirty="0"/>
+                    </a:p>
+                  </a:txBody>
+                  <a:tcPr/>
+                </a:tc>
+                <a:tc>
+                  <a:txBody>
+                    <a:bodyPr/>
+                    <a:lstStyle/>
+                    <a:p>
+                      <a:r>
+                        <a:rPr lang="sv-SE" dirty="0" smtClean="0"/>
+                        <a:t>2004-12-08</a:t>
+                      </a:r>
+                      <a:endParaRPr lang="sv-SE" dirty="0"/>
+                    </a:p>
+                  </a:txBody>
+                  <a:tcPr/>
+                </a:tc>
+              </a:tr>
+            </a:tbl>
+          </a:graphicData>
+        </a:graphic>
+      </p:graphicFrame>
+      <p:sp>
+        <p:nvSpPr>
+          <p:cNvPr id="5" name="TextBox 4"/>
+          <p:cNvSpPr txBox="1"/>
+          <p:nvPr/>
+        </p:nvSpPr>
+        <p:spPr>
+          <a:xfrm>
+            <a:off x="0" y="1440241"/>
+            <a:ext cx="2806474" cy="369332"/>
+          </a:xfrm>
+          <a:prstGeom prst="rect">
+            <a:avLst/>
+          </a:prstGeom>
+          <a:noFill/>
+        </p:spPr>
+        <p:txBody>
+          <a:bodyPr wrap="none" rtlCol="0">
+            <a:spAutoFit/>
+          </a:bodyPr>
+          <a:lstStyle/>
+          <a:p>
+            <a:r>
+              <a:rPr lang="sv-SE" dirty="0" smtClean="0"/>
+              <a:t>Datortabell - Onormaliserad</a:t>
+            </a:r>
+            <a:endParaRPr lang="sv-SE" dirty="0"/>
+          </a:p>
+        </p:txBody>
+      </p:sp>
+      <p:sp>
+        <p:nvSpPr>
+          <p:cNvPr id="6" name="Rectangle 5"/>
+          <p:cNvSpPr/>
+          <p:nvPr/>
+        </p:nvSpPr>
+        <p:spPr>
+          <a:xfrm>
+            <a:off x="323528" y="764704"/>
+            <a:ext cx="1512168" cy="576064"/>
+          </a:xfrm>
+          <a:prstGeom prst="rect">
+            <a:avLst/>
+          </a:prstGeom>
+        </p:spPr>
+        <p:style>
+          <a:lnRef idx="2">
+            <a:schemeClr val="accent1">
+              <a:shade val="50000"/>
+            </a:schemeClr>
+          </a:lnRef>
+          <a:fillRef idx="1">
+            <a:schemeClr val="accent1"/>
+          </a:fillRef>
+          <a:effectRef idx="0">
+            <a:schemeClr val="accent1"/>
+          </a:effectRef>
+          <a:fontRef idx="minor">
+            <a:schemeClr val="lt1"/>
+          </a:fontRef>
+        </p:style>
+        <p:txBody>
+          <a:bodyPr rtlCol="0" anchor="ctr"/>
+          <a:lstStyle/>
+          <a:p>
+            <a:pPr algn="ctr"/>
+            <a:r>
+              <a:rPr lang="sv-SE" dirty="0" smtClean="0"/>
+              <a:t>Dator</a:t>
+            </a:r>
+            <a:endParaRPr lang="sv-SE" dirty="0"/>
+          </a:p>
+        </p:txBody>
+      </p:sp>
+    </p:spTree>
+    <p:extLst>
+      <p:ext uri="{BB962C8B-B14F-4D97-AF65-F5344CB8AC3E}">
+        <p14:creationId xmlns:p14="http://schemas.microsoft.com/office/powerpoint/2010/main" val="3388494997"/>
       </p:ext>
     </p:extLst>
   </p:cSld>

</xml_diff>